<commit_message>
adds updated final P1
</commit_message>
<xml_diff>
--- a/Project1/Project1/PowerPoint/Project 1.pptx
+++ b/Project1/Project1/PowerPoint/Project 1.pptx
@@ -222,7 +222,7 @@
           <a:p>
             <a:fld id="{EF1077DB-935E-4A0A-947A-D283B9F9F452}" type="datetimeFigureOut">
               <a:rPr lang="en-US" smtClean="0"/>
-              <a:t>5/19/2020</a:t>
+              <a:t>5/20/2020</a:t>
             </a:fld>
             <a:endParaRPr lang="en-US" dirty="0"/>
           </a:p>
@@ -399,7 +399,7 @@
           <a:p>
             <a:fld id="{348F815A-5A10-42A8-9FEC-3938D2D9BA48}" type="datetimeFigureOut">
               <a:rPr lang="en-US" noProof="0" smtClean="0"/>
-              <a:t>5/19/2020</a:t>
+              <a:t>5/20/2020</a:t>
             </a:fld>
             <a:endParaRPr lang="en-US" noProof="0" dirty="0"/>
           </a:p>
@@ -33207,8 +33207,8 @@
           <a:p>
             <a:pPr marL="828675" lvl="1" indent="-285750"/>
             <a:r>
-              <a:rPr lang="en-US" sz="2400" b="1" dirty="0"/>
-              <a:t>Controllers/Models/Views</a:t>
+              <a:rPr lang="en-US" sz="2000" b="1" dirty="0"/>
+              <a:t>Controllers/Models/Views – Strongly Typed/minimum logic</a:t>
             </a:r>
           </a:p>
           <a:p>
@@ -38124,23 +38124,6 @@
 </file>
 
 <file path=customXml/item1.xml><?xml version="1.0" encoding="utf-8"?>
-<p:properties xmlns:p="http://schemas.microsoft.com/office/2006/metadata/properties" xmlns:xsi="http://www.w3.org/2001/XMLSchema-instance" xmlns:pc="http://schemas.microsoft.com/office/infopath/2007/PartnerControls">
-  <documentManagement>
-    <MediaServiceKeyPoints xmlns="71af3243-3dd4-4a8d-8c0d-dd76da1f02a5" xsi:nil="true"/>
-  </documentManagement>
-</p:properties>
-</file>
-
-<file path=customXml/item2.xml><?xml version="1.0" encoding="utf-8"?>
-<?mso-contentType ?>
-<FormTemplates xmlns="http://schemas.microsoft.com/sharepoint/v3/contenttype/forms">
-  <Display>DocumentLibraryForm</Display>
-  <Edit>DocumentLibraryForm</Edit>
-  <New>DocumentLibraryForm</New>
-</FormTemplates>
-</file>
-
-<file path=customXml/item3.xml><?xml version="1.0" encoding="utf-8"?>
 <ct:contentTypeSchema xmlns:ct="http://schemas.microsoft.com/office/2006/metadata/contentType" xmlns:ma="http://schemas.microsoft.com/office/2006/metadata/properties/metaAttributes" ct:_="" ma:_="" ma:contentTypeName="Document" ma:contentTypeID="0x01010079F111ED35F8CC479449609E8A0923A6" ma:contentTypeVersion="11" ma:contentTypeDescription="Create a new document." ma:contentTypeScope="" ma:versionID="9677210f24a1be23c92c90fd886aa0aa">
   <xsd:schema xmlns:xsd="http://www.w3.org/2001/XMLSchema" xmlns:xs="http://www.w3.org/2001/XMLSchema" xmlns:p="http://schemas.microsoft.com/office/2006/metadata/properties" xmlns:ns2="71af3243-3dd4-4a8d-8c0d-dd76da1f02a5" xmlns:ns3="16c05727-aa75-4e4a-9b5f-8a80a1165891" targetNamespace="http://schemas.microsoft.com/office/2006/metadata/properties" ma:root="true" ma:fieldsID="60e05723c5c1908df1a1a4ebf11d344e" ns2:_="" ns3:_="">
     <xsd:import namespace="71af3243-3dd4-4a8d-8c0d-dd76da1f02a5"/>
@@ -38351,25 +38334,24 @@
 </ct:contentTypeSchema>
 </file>
 
-<file path=customXml/itemProps1.xml><?xml version="1.0" encoding="utf-8"?>
-<ds:datastoreItem xmlns:ds="http://schemas.openxmlformats.org/officeDocument/2006/customXml" ds:itemID="{ABC5C908-4F22-4D49-B2AD-A48F9AB51175}">
-  <ds:schemaRefs>
-    <ds:schemaRef ds:uri="http://schemas.microsoft.com/office/2006/metadata/properties"/>
-    <ds:schemaRef ds:uri="http://schemas.microsoft.com/office/infopath/2007/PartnerControls"/>
-    <ds:schemaRef ds:uri="71af3243-3dd4-4a8d-8c0d-dd76da1f02a5"/>
-  </ds:schemaRefs>
-</ds:datastoreItem>
+<file path=customXml/item2.xml><?xml version="1.0" encoding="utf-8"?>
+<?mso-contentType ?>
+<FormTemplates xmlns="http://schemas.microsoft.com/sharepoint/v3/contenttype/forms">
+  <Display>DocumentLibraryForm</Display>
+  <Edit>DocumentLibraryForm</Edit>
+  <New>DocumentLibraryForm</New>
+</FormTemplates>
 </file>
 
-<file path=customXml/itemProps2.xml><?xml version="1.0" encoding="utf-8"?>
-<ds:datastoreItem xmlns:ds="http://schemas.openxmlformats.org/officeDocument/2006/customXml" ds:itemID="{96DB9DAA-588F-4E7A-A8D1-E2EBF048F1AE}">
-  <ds:schemaRefs>
-    <ds:schemaRef ds:uri="http://schemas.microsoft.com/sharepoint/v3/contenttype/forms"/>
-  </ds:schemaRefs>
-</ds:datastoreItem>
+<file path=customXml/item3.xml><?xml version="1.0" encoding="utf-8"?>
+<p:properties xmlns:p="http://schemas.microsoft.com/office/2006/metadata/properties" xmlns:xsi="http://www.w3.org/2001/XMLSchema-instance" xmlns:pc="http://schemas.microsoft.com/office/infopath/2007/PartnerControls">
+  <documentManagement>
+    <MediaServiceKeyPoints xmlns="71af3243-3dd4-4a8d-8c0d-dd76da1f02a5" xsi:nil="true"/>
+  </documentManagement>
+</p:properties>
 </file>
 
-<file path=customXml/itemProps3.xml><?xml version="1.0" encoding="utf-8"?>
+<file path=customXml/itemProps1.xml><?xml version="1.0" encoding="utf-8"?>
 <ds:datastoreItem xmlns:ds="http://schemas.openxmlformats.org/officeDocument/2006/customXml" ds:itemID="{8332F27D-DD05-4984-A261-62350E39A094}">
   <ds:schemaRefs>
     <ds:schemaRef ds:uri="http://schemas.microsoft.com/office/2006/metadata/contentType"/>
@@ -38386,4 +38368,22 @@
     <ds:schemaRef ds:uri="http://schemas.microsoft.com/internal/obd"/>
   </ds:schemaRefs>
 </ds:datastoreItem>
+</file>
+
+<file path=customXml/itemProps2.xml><?xml version="1.0" encoding="utf-8"?>
+<ds:datastoreItem xmlns:ds="http://schemas.openxmlformats.org/officeDocument/2006/customXml" ds:itemID="{96DB9DAA-588F-4E7A-A8D1-E2EBF048F1AE}">
+  <ds:schemaRefs>
+    <ds:schemaRef ds:uri="http://schemas.microsoft.com/sharepoint/v3/contenttype/forms"/>
+  </ds:schemaRefs>
+</ds:datastoreItem>
+</file>
+
+<file path=customXml/itemProps3.xml><?xml version="1.0" encoding="utf-8"?>
+<ds:datastoreItem xmlns:ds="http://schemas.openxmlformats.org/officeDocument/2006/customXml" ds:itemID="{ABC5C908-4F22-4D49-B2AD-A48F9AB51175}">
+  <ds:schemaRefs>
+    <ds:schemaRef ds:uri="http://schemas.microsoft.com/office/2006/metadata/properties"/>
+    <ds:schemaRef ds:uri="http://schemas.microsoft.com/office/infopath/2007/PartnerControls"/>
+    <ds:schemaRef ds:uri="71af3243-3dd4-4a8d-8c0d-dd76da1f02a5"/>
+  </ds:schemaRefs>
+</ds:datastoreItem>
 </file>
</xml_diff>